<commit_message>
Corrected deadlock sample + minor improvement to the presentation
</commit_message>
<xml_diff>
--- a/production-debugging/production-debugging-101.pptx
+++ b/production-debugging/production-debugging-101.pptx
@@ -11,8 +11,9 @@
     <p:sldId id="259" r:id="rId5"/>
     <p:sldId id="263" r:id="rId6"/>
     <p:sldId id="260" r:id="rId7"/>
-    <p:sldId id="261" r:id="rId8"/>
-    <p:sldId id="262" r:id="rId9"/>
+    <p:sldId id="264" r:id="rId8"/>
+    <p:sldId id="261" r:id="rId9"/>
+    <p:sldId id="262" r:id="rId10"/>
   </p:sldIdLst>
   <p:sldSz cx="9144000" cy="6858000" type="screen4x3"/>
   <p:notesSz cx="6858000" cy="9144000"/>
@@ -189,7 +190,6 @@
               <a:rPr lang="en-US" noProof="0" smtClean="0"/>
               <a:t>Click to edit Master title style</a:t>
             </a:r>
-            <a:endParaRPr lang="en-US" noProof="0" smtClean="0"/>
           </a:p>
         </p:txBody>
       </p:sp>
@@ -237,7 +237,6 @@
               <a:rPr lang="en-US" noProof="0" smtClean="0"/>
               <a:t>Click to edit Master subtitle style</a:t>
             </a:r>
-            <a:endParaRPr lang="en-US" noProof="0" smtClean="0"/>
           </a:p>
         </p:txBody>
       </p:sp>
@@ -1697,7 +1696,6 @@
               <a:rPr lang="en-US" noProof="0" smtClean="0"/>
               <a:t>Drag picture to placeholder or click icon to add</a:t>
             </a:r>
-            <a:endParaRPr lang="en-US" noProof="0" smtClean="0"/>
           </a:p>
         </p:txBody>
       </p:sp>
@@ -2957,6 +2955,34 @@
           <a:chExt cx="0" cy="0"/>
         </a:xfrm>
       </p:grpSpPr>
+      <p:pic>
+        <p:nvPicPr>
+          <p:cNvPr id="4" name="Picture 3"/>
+          <p:cNvPicPr>
+            <a:picLocks noChangeAspect="1"/>
+          </p:cNvPicPr>
+          <p:nvPr/>
+        </p:nvPicPr>
+        <p:blipFill rotWithShape="1">
+          <a:blip r:embed="rId2">
+            <a:alphaModFix/>
+          </a:blip>
+          <a:srcRect t="31908"/>
+          <a:stretch/>
+        </p:blipFill>
+        <p:spPr>
+          <a:xfrm>
+            <a:off x="722313" y="3725862"/>
+            <a:ext cx="5806769" cy="2471227"/>
+          </a:xfrm>
+          <a:prstGeom prst="rect">
+            <a:avLst/>
+          </a:prstGeom>
+          <a:effectLst>
+            <a:reflection blurRad="6350" stA="50000" endA="300" endPos="38500" dist="50800" dir="5400000" sy="-100000" algn="bl" rotWithShape="0"/>
+          </a:effectLst>
+        </p:spPr>
+      </p:pic>
       <p:sp>
         <p:nvSpPr>
           <p:cNvPr id="2" name="Title 1"/>
@@ -2967,18 +2993,24 @@
             <p:ph type="title"/>
           </p:nvPr>
         </p:nvSpPr>
-        <p:spPr/>
+        <p:spPr>
+          <a:xfrm>
+            <a:off x="722313" y="2363787"/>
+            <a:ext cx="7772400" cy="1362075"/>
+          </a:xfrm>
+        </p:spPr>
         <p:txBody>
           <a:bodyPr/>
           <a:lstStyle/>
           <a:p>
+            <a:pPr algn="r"/>
             <a:r>
               <a:rPr lang="en-US" sz="6600" dirty="0" smtClean="0">
                 <a:solidFill>
                   <a:srgbClr val="A17969"/>
                 </a:solidFill>
               </a:rPr>
-              <a:t>Meet MAT (sic.)</a:t>
+              <a:t>JVISUALVM</a:t>
             </a:r>
             <a:endParaRPr lang="en-US" sz="6600" dirty="0">
               <a:solidFill>
@@ -2998,14 +3030,20 @@
             <p:ph type="body" idx="1"/>
           </p:nvPr>
         </p:nvSpPr>
-        <p:spPr/>
+        <p:spPr>
+          <a:xfrm>
+            <a:off x="4118311" y="725488"/>
+            <a:ext cx="4376402" cy="1500187"/>
+          </a:xfrm>
+        </p:spPr>
         <p:txBody>
           <a:bodyPr/>
           <a:lstStyle/>
           <a:p>
+            <a:pPr algn="r"/>
             <a:r>
               <a:rPr lang="en-US" sz="3600" dirty="0" smtClean="0"/>
-              <a:t>If there’s time…</a:t>
+              <a:t>And now, with GUI</a:t>
             </a:r>
             <a:endParaRPr lang="en-US" sz="3600" dirty="0"/>
           </a:p>
@@ -3014,7 +3052,7 @@
     </p:spTree>
     <p:extLst>
       <p:ext uri="{BB962C8B-B14F-4D97-AF65-F5344CB8AC3E}">
-        <p14:creationId xmlns:p14="http://schemas.microsoft.com/office/powerpoint/2010/main" val="299811102"/>
+        <p14:creationId xmlns:p14="http://schemas.microsoft.com/office/powerpoint/2010/main" val="111626218"/>
       </p:ext>
     </p:extLst>
   </p:cSld>
@@ -3043,7 +3081,7 @@
       </p:grpSpPr>
       <p:sp>
         <p:nvSpPr>
-          <p:cNvPr id="4" name="Title 3"/>
+          <p:cNvPr id="2" name="Title 1"/>
           <p:cNvSpPr>
             <a:spLocks noGrp="1"/>
           </p:cNvSpPr>
@@ -3057,6 +3095,90 @@
           <a:lstStyle/>
           <a:p>
             <a:r>
+              <a:rPr lang="en-US" sz="6600" dirty="0" smtClean="0">
+                <a:solidFill>
+                  <a:srgbClr val="A17969"/>
+                </a:solidFill>
+              </a:rPr>
+              <a:t>Meet MAT (sic.)</a:t>
+            </a:r>
+            <a:endParaRPr lang="en-US" sz="6600" dirty="0">
+              <a:solidFill>
+                <a:srgbClr val="A17969"/>
+              </a:solidFill>
+            </a:endParaRPr>
+          </a:p>
+        </p:txBody>
+      </p:sp>
+      <p:sp>
+        <p:nvSpPr>
+          <p:cNvPr id="3" name="Text Placeholder 2"/>
+          <p:cNvSpPr>
+            <a:spLocks noGrp="1"/>
+          </p:cNvSpPr>
+          <p:nvPr>
+            <p:ph type="body" idx="1"/>
+          </p:nvPr>
+        </p:nvSpPr>
+        <p:spPr/>
+        <p:txBody>
+          <a:bodyPr/>
+          <a:lstStyle/>
+          <a:p>
+            <a:r>
+              <a:rPr lang="en-US" sz="3600" dirty="0" smtClean="0"/>
+              <a:t>If there’s time…</a:t>
+            </a:r>
+            <a:endParaRPr lang="en-US" sz="3600" dirty="0"/>
+          </a:p>
+        </p:txBody>
+      </p:sp>
+    </p:spTree>
+    <p:extLst>
+      <p:ext uri="{BB962C8B-B14F-4D97-AF65-F5344CB8AC3E}">
+        <p14:creationId xmlns:p14="http://schemas.microsoft.com/office/powerpoint/2010/main" val="299811102"/>
+      </p:ext>
+    </p:extLst>
+  </p:cSld>
+  <p:clrMapOvr>
+    <a:masterClrMapping/>
+  </p:clrMapOvr>
+</p:sld>
+</file>
+
+<file path=ppt/slides/slide9.xml><?xml version="1.0" encoding="utf-8"?>
+<p:sld xmlns:a="http://schemas.openxmlformats.org/drawingml/2006/main" xmlns:r="http://schemas.openxmlformats.org/officeDocument/2006/relationships" xmlns:p="http://schemas.openxmlformats.org/presentationml/2006/main">
+  <p:cSld>
+    <p:spTree>
+      <p:nvGrpSpPr>
+        <p:cNvPr id="1" name=""/>
+        <p:cNvGrpSpPr/>
+        <p:nvPr/>
+      </p:nvGrpSpPr>
+      <p:grpSpPr>
+        <a:xfrm>
+          <a:off x="0" y="0"/>
+          <a:ext cx="0" cy="0"/>
+          <a:chOff x="0" y="0"/>
+          <a:chExt cx="0" cy="0"/>
+        </a:xfrm>
+      </p:grpSpPr>
+      <p:sp>
+        <p:nvSpPr>
+          <p:cNvPr id="4" name="Title 3"/>
+          <p:cNvSpPr>
+            <a:spLocks noGrp="1"/>
+          </p:cNvSpPr>
+          <p:nvPr>
+            <p:ph type="title"/>
+          </p:nvPr>
+        </p:nvSpPr>
+        <p:spPr/>
+        <p:txBody>
+          <a:bodyPr/>
+          <a:lstStyle/>
+          <a:p>
+            <a:r>
               <a:rPr lang="en-US" dirty="0" smtClean="0"/>
               <a:t>Hurrah</a:t>
             </a:r>
@@ -3081,13 +3203,25 @@
           <a:p>
             <a:r>
               <a:rPr lang="en-US" dirty="0" smtClean="0"/>
-              <a:t>Thank you for your time!</a:t>
-            </a:r>
-          </a:p>
-          <a:p>
+              <a:t>Thank you for your time</a:t>
+            </a:r>
             <a:r>
               <a:rPr lang="en-US" dirty="0" smtClean="0"/>
-              <a:t>Comments, questions etc.:</a:t>
+              <a:t>!</a:t>
+            </a:r>
+          </a:p>
+          <a:p>
+            <a:r>
+              <a:rPr lang="en-US" dirty="0" smtClean="0"/>
+              <a:t>Presentation and </a:t>
+            </a:r>
+            <a:r>
+              <a:rPr lang="en-US" dirty="0"/>
+              <a:t>code </a:t>
+            </a:r>
+            <a:r>
+              <a:rPr lang="en-US" dirty="0" smtClean="0"/>
+              <a:t>samples:</a:t>
             </a:r>
           </a:p>
           <a:p>
@@ -3096,15 +3230,47 @@
               <a:rPr lang="en-US" dirty="0" smtClean="0">
                 <a:hlinkClick r:id="rId2"/>
               </a:rPr>
-              <a:t>tomer@tomergabel.com</a:t>
+              <a:t>http</a:t>
+            </a:r>
+            <a:r>
+              <a:rPr lang="en-US" dirty="0">
+                <a:hlinkClick r:id="rId2"/>
+              </a:rPr>
+              <a:t>://bit.ly/</a:t>
+            </a:r>
+            <a:r>
+              <a:rPr lang="en-US" dirty="0" smtClean="0">
+                <a:hlinkClick r:id="rId2"/>
+              </a:rPr>
+              <a:t>PUFHws</a:t>
             </a:r>
             <a:endParaRPr lang="en-US" dirty="0" smtClean="0"/>
+          </a:p>
+          <a:p>
+            <a:r>
+              <a:rPr lang="en-US" dirty="0" smtClean="0"/>
+              <a:t>Comments</a:t>
+            </a:r>
+            <a:r>
+              <a:rPr lang="en-US" dirty="0" smtClean="0"/>
+              <a:t>, questions etc.:</a:t>
+            </a:r>
           </a:p>
           <a:p>
             <a:pPr lvl="1"/>
             <a:r>
               <a:rPr lang="en-US" dirty="0" smtClean="0">
                 <a:hlinkClick r:id="rId3"/>
+              </a:rPr>
+              <a:t>tomer@tomergabel.com</a:t>
+            </a:r>
+            <a:endParaRPr lang="en-US" dirty="0" smtClean="0"/>
+          </a:p>
+          <a:p>
+            <a:pPr lvl="1"/>
+            <a:r>
+              <a:rPr lang="en-US" dirty="0" smtClean="0">
+                <a:hlinkClick r:id="rId4"/>
               </a:rPr>
               <a:t>http://www.tomergabel.com</a:t>
             </a:r>

</xml_diff>